<commit_message>
final reports without sol3
</commit_message>
<xml_diff>
--- a/lab3/lsal/Lab3 Presentation.pptx
+++ b/lab3/lsal/Lab3 Presentation.pptx
@@ -119,6 +119,11 @@
       </a:defRPr>
     </a:lvl9pPr>
   </p:defaultTextStyle>
+  <p:extLst>
+    <p:ext uri="{EFAFB233-063F-42B5-8137-9DF3F51BA10A}">
+      <p15:sldGuideLst xmlns:p15="http://schemas.microsoft.com/office/powerpoint/2012/main"/>
+    </p:ext>
+  </p:extLst>
 </p:presentation>
 </file>
 
@@ -8617,48 +8622,1642 @@
           <a:lstStyle/>
           <a:p>
             <a:r>
-              <a:rPr lang="en-GB" dirty="0" err="1"/>
-              <a:t>Comparisohahaha</a:t>
+              <a:rPr lang="en-GB" dirty="0"/>
+              <a:t>Comparison</a:t>
             </a:r>
             <a:endParaRPr lang="el-GR" dirty="0"/>
           </a:p>
         </p:txBody>
       </p:sp>
-      <p:sp>
-        <p:nvSpPr>
-          <p:cNvPr id="3" name="Θέση περιεχομένου 2">
+      <p:graphicFrame>
+        <p:nvGraphicFramePr>
+          <p:cNvPr id="5" name="Content Placeholder 4">
             <a:extLst>
               <a:ext uri="{FF2B5EF4-FFF2-40B4-BE49-F238E27FC236}">
-                <a16:creationId xmlns:a16="http://schemas.microsoft.com/office/drawing/2014/main" id="{FE1E8FF8-8FCF-6726-28D3-DADF527CCD98}"/>
+                <a16:creationId xmlns:a16="http://schemas.microsoft.com/office/drawing/2014/main" id="{33AF7710-8F3E-A349-1D69-A88E424D47C3}"/>
               </a:ext>
             </a:extLst>
           </p:cNvPr>
-          <p:cNvSpPr>
-            <a:spLocks noGrp="1"/>
-          </p:cNvSpPr>
+          <p:cNvGraphicFramePr>
+            <a:graphicFrameLocks noGrp="1"/>
+          </p:cNvGraphicFramePr>
           <p:nvPr>
             <p:ph idx="1"/>
+            <p:extLst>
+              <p:ext uri="{D42A27DB-BD31-4B8C-83A1-F6EECF244321}">
+                <p14:modId xmlns:p14="http://schemas.microsoft.com/office/powerpoint/2010/main" val="2931059811"/>
+              </p:ext>
+            </p:extLst>
           </p:nvPr>
-        </p:nvSpPr>
-        <p:spPr>
-          <a:xfrm>
-            <a:off x="838199" y="1825625"/>
-            <a:ext cx="10515600" cy="4351338"/>
-          </a:xfrm>
-        </p:spPr>
-        <p:txBody>
-          <a:bodyPr>
-            <a:normAutofit/>
-          </a:bodyPr>
-          <a:lstStyle/>
-          <a:p>
-            <a:pPr marL="0" indent="0">
-              <a:buNone/>
-            </a:pPr>
-            <a:endParaRPr lang="en-GB" dirty="0"/>
-          </a:p>
-        </p:txBody>
-      </p:sp>
+        </p:nvGraphicFramePr>
+        <p:xfrm>
+          <a:off x="3027008" y="2313805"/>
+          <a:ext cx="6137983" cy="2230389"/>
+        </p:xfrm>
+        <a:graphic>
+          <a:graphicData uri="http://schemas.openxmlformats.org/drawingml/2006/table">
+            <a:tbl>
+              <a:tblPr firstRow="1" firstCol="1" bandRow="1"/>
+              <a:tblGrid>
+                <a:gridCol w="860256">
+                  <a:extLst>
+                    <a:ext uri="{9D8B030D-6E8A-4147-A177-3AD203B41FA5}">
+                      <a16:colId xmlns:a16="http://schemas.microsoft.com/office/drawing/2014/main" val="3945855272"/>
+                    </a:ext>
+                  </a:extLst>
+                </a:gridCol>
+                <a:gridCol w="1344149">
+                  <a:extLst>
+                    <a:ext uri="{9D8B030D-6E8A-4147-A177-3AD203B41FA5}">
+                      <a16:colId xmlns:a16="http://schemas.microsoft.com/office/drawing/2014/main" val="119344123"/>
+                    </a:ext>
+                  </a:extLst>
+                </a:gridCol>
+                <a:gridCol w="2213072">
+                  <a:extLst>
+                    <a:ext uri="{9D8B030D-6E8A-4147-A177-3AD203B41FA5}">
+                      <a16:colId xmlns:a16="http://schemas.microsoft.com/office/drawing/2014/main" val="3478210298"/>
+                    </a:ext>
+                  </a:extLst>
+                </a:gridCol>
+                <a:gridCol w="1720506">
+                  <a:extLst>
+                    <a:ext uri="{9D8B030D-6E8A-4147-A177-3AD203B41FA5}">
+                      <a16:colId xmlns:a16="http://schemas.microsoft.com/office/drawing/2014/main" val="72348858"/>
+                    </a:ext>
+                  </a:extLst>
+                </a:gridCol>
+              </a:tblGrid>
+              <a:tr h="403240">
+                <a:tc gridSpan="4">
+                  <a:txBody>
+                    <a:bodyPr/>
+                    <a:lstStyle/>
+                    <a:p>
+                      <a:pPr algn="ctr">
+                        <a:lnSpc>
+                          <a:spcPct val="107000"/>
+                        </a:lnSpc>
+                        <a:spcAft>
+                          <a:spcPts val="800"/>
+                        </a:spcAft>
+                      </a:pPr>
+                      <a:r>
+                        <a:rPr lang="en-GB" sz="2800" b="1" dirty="0">
+                          <a:solidFill>
+                            <a:srgbClr val="FFFFFF"/>
+                          </a:solidFill>
+                          <a:effectLst/>
+                          <a:highlight>
+                            <a:srgbClr val="5B9BD5"/>
+                          </a:highlight>
+                          <a:latin typeface="Aptos Narrow" panose="020B0004020202020204" pitchFamily="34" charset="0"/>
+                          <a:ea typeface="Times New Roman" panose="02020603050405020304" pitchFamily="18" charset="0"/>
+                          <a:cs typeface="Times New Roman" panose="02020603050405020304" pitchFamily="18" charset="0"/>
+                        </a:rPr>
+                        <a:t>FPGA vs x86</a:t>
+                      </a:r>
+                      <a:endParaRPr lang="en-US" sz="2800" dirty="0">
+                        <a:effectLst/>
+                        <a:highlight>
+                          <a:srgbClr val="5B9BD5"/>
+                        </a:highlight>
+                        <a:latin typeface="Calibri" panose="020F0502020204030204" pitchFamily="34" charset="0"/>
+                        <a:ea typeface="Calibri" panose="020F0502020204030204" pitchFamily="34" charset="0"/>
+                        <a:cs typeface="Times New Roman" panose="02020603050405020304" pitchFamily="18" charset="0"/>
+                      </a:endParaRPr>
+                    </a:p>
+                  </a:txBody>
+                  <a:tcPr marL="68580" marR="68580" marT="0" marB="0" anchor="b">
+                    <a:lnL w="12700" cap="flat" cmpd="sng" algn="ctr">
+                      <a:solidFill>
+                        <a:srgbClr val="5B9BD5"/>
+                      </a:solidFill>
+                      <a:prstDash val="solid"/>
+                      <a:round/>
+                      <a:headEnd type="none" w="med" len="med"/>
+                      <a:tailEnd type="none" w="med" len="med"/>
+                    </a:lnL>
+                    <a:lnR w="12700" cap="flat" cmpd="sng" algn="ctr">
+                      <a:solidFill>
+                        <a:srgbClr val="5B9BD5"/>
+                      </a:solidFill>
+                      <a:prstDash val="solid"/>
+                      <a:round/>
+                      <a:headEnd type="none" w="med" len="med"/>
+                      <a:tailEnd type="none" w="med" len="med"/>
+                    </a:lnR>
+                    <a:lnT w="12700" cap="flat" cmpd="sng" algn="ctr">
+                      <a:solidFill>
+                        <a:srgbClr val="5B9BD5"/>
+                      </a:solidFill>
+                      <a:prstDash val="solid"/>
+                      <a:round/>
+                      <a:headEnd type="none" w="med" len="med"/>
+                      <a:tailEnd type="none" w="med" len="med"/>
+                    </a:lnT>
+                    <a:lnB w="12700" cap="flat" cmpd="sng" algn="ctr">
+                      <a:solidFill>
+                        <a:srgbClr val="5B9BD5"/>
+                      </a:solidFill>
+                      <a:prstDash val="solid"/>
+                      <a:round/>
+                      <a:headEnd type="none" w="med" len="med"/>
+                      <a:tailEnd type="none" w="med" len="med"/>
+                    </a:lnB>
+                    <a:solidFill>
+                      <a:srgbClr val="5B9BD5"/>
+                    </a:solidFill>
+                  </a:tcPr>
+                </a:tc>
+                <a:tc hMerge="1">
+                  <a:txBody>
+                    <a:bodyPr/>
+                    <a:lstStyle/>
+                    <a:p>
+                      <a:pPr algn="ctr">
+                        <a:lnSpc>
+                          <a:spcPct val="107000"/>
+                        </a:lnSpc>
+                        <a:spcAft>
+                          <a:spcPts val="800"/>
+                        </a:spcAft>
+                      </a:pPr>
+                      <a:endParaRPr lang="en-US" sz="2800" dirty="0">
+                        <a:effectLst/>
+                        <a:highlight>
+                          <a:srgbClr val="5B9BD5"/>
+                        </a:highlight>
+                        <a:latin typeface="Calibri" panose="020F0502020204030204" pitchFamily="34" charset="0"/>
+                        <a:ea typeface="Calibri" panose="020F0502020204030204" pitchFamily="34" charset="0"/>
+                        <a:cs typeface="Times New Roman" panose="02020603050405020304" pitchFamily="18" charset="0"/>
+                      </a:endParaRPr>
+                    </a:p>
+                  </a:txBody>
+                  <a:tcPr marL="68580" marR="68580" marT="0" marB="0" anchor="b">
+                    <a:lnL w="12700" cap="flat" cmpd="sng" algn="ctr">
+                      <a:solidFill>
+                        <a:srgbClr val="5B9BD5"/>
+                      </a:solidFill>
+                      <a:prstDash val="solid"/>
+                      <a:round/>
+                      <a:headEnd type="none" w="med" len="med"/>
+                      <a:tailEnd type="none" w="med" len="med"/>
+                    </a:lnL>
+                    <a:lnR w="12700" cap="flat" cmpd="sng" algn="ctr">
+                      <a:solidFill>
+                        <a:srgbClr val="5B9BD5"/>
+                      </a:solidFill>
+                      <a:prstDash val="solid"/>
+                      <a:round/>
+                      <a:headEnd type="none" w="med" len="med"/>
+                      <a:tailEnd type="none" w="med" len="med"/>
+                    </a:lnR>
+                    <a:lnT w="12700" cap="flat" cmpd="sng" algn="ctr">
+                      <a:solidFill>
+                        <a:srgbClr val="5B9BD5"/>
+                      </a:solidFill>
+                      <a:prstDash val="solid"/>
+                      <a:round/>
+                      <a:headEnd type="none" w="med" len="med"/>
+                      <a:tailEnd type="none" w="med" len="med"/>
+                    </a:lnT>
+                    <a:lnB w="12700" cap="flat" cmpd="sng" algn="ctr">
+                      <a:solidFill>
+                        <a:srgbClr val="5B9BD5"/>
+                      </a:solidFill>
+                      <a:prstDash val="solid"/>
+                      <a:round/>
+                      <a:headEnd type="none" w="med" len="med"/>
+                      <a:tailEnd type="none" w="med" len="med"/>
+                    </a:lnB>
+                    <a:solidFill>
+                      <a:srgbClr val="5B9BD5"/>
+                    </a:solidFill>
+                  </a:tcPr>
+                </a:tc>
+                <a:tc hMerge="1">
+                  <a:txBody>
+                    <a:bodyPr/>
+                    <a:lstStyle/>
+                    <a:p>
+                      <a:pPr algn="ctr">
+                        <a:lnSpc>
+                          <a:spcPct val="107000"/>
+                        </a:lnSpc>
+                        <a:spcAft>
+                          <a:spcPts val="800"/>
+                        </a:spcAft>
+                      </a:pPr>
+                      <a:endParaRPr lang="en-US" sz="2800" dirty="0">
+                        <a:effectLst/>
+                        <a:highlight>
+                          <a:srgbClr val="5B9BD5"/>
+                        </a:highlight>
+                        <a:latin typeface="Calibri" panose="020F0502020204030204" pitchFamily="34" charset="0"/>
+                        <a:ea typeface="Calibri" panose="020F0502020204030204" pitchFamily="34" charset="0"/>
+                        <a:cs typeface="Times New Roman" panose="02020603050405020304" pitchFamily="18" charset="0"/>
+                      </a:endParaRPr>
+                    </a:p>
+                  </a:txBody>
+                  <a:tcPr marL="68580" marR="68580" marT="0" marB="0" anchor="b">
+                    <a:lnL w="12700" cap="flat" cmpd="sng" algn="ctr">
+                      <a:solidFill>
+                        <a:srgbClr val="5B9BD5"/>
+                      </a:solidFill>
+                      <a:prstDash val="solid"/>
+                      <a:round/>
+                      <a:headEnd type="none" w="med" len="med"/>
+                      <a:tailEnd type="none" w="med" len="med"/>
+                    </a:lnL>
+                    <a:lnR w="12700" cap="flat" cmpd="sng" algn="ctr">
+                      <a:solidFill>
+                        <a:srgbClr val="5B9BD5"/>
+                      </a:solidFill>
+                      <a:prstDash val="solid"/>
+                      <a:round/>
+                      <a:headEnd type="none" w="med" len="med"/>
+                      <a:tailEnd type="none" w="med" len="med"/>
+                    </a:lnR>
+                    <a:lnT w="12700" cap="flat" cmpd="sng" algn="ctr">
+                      <a:solidFill>
+                        <a:srgbClr val="5B9BD5"/>
+                      </a:solidFill>
+                      <a:prstDash val="solid"/>
+                      <a:round/>
+                      <a:headEnd type="none" w="med" len="med"/>
+                      <a:tailEnd type="none" w="med" len="med"/>
+                    </a:lnT>
+                    <a:lnB w="12700" cap="flat" cmpd="sng" algn="ctr">
+                      <a:solidFill>
+                        <a:srgbClr val="5B9BD5"/>
+                      </a:solidFill>
+                      <a:prstDash val="solid"/>
+                      <a:round/>
+                      <a:headEnd type="none" w="med" len="med"/>
+                      <a:tailEnd type="none" w="med" len="med"/>
+                    </a:lnB>
+                    <a:solidFill>
+                      <a:srgbClr val="5B9BD5"/>
+                    </a:solidFill>
+                  </a:tcPr>
+                </a:tc>
+                <a:tc hMerge="1">
+                  <a:txBody>
+                    <a:bodyPr/>
+                    <a:lstStyle/>
+                    <a:p>
+                      <a:pPr algn="ctr">
+                        <a:lnSpc>
+                          <a:spcPct val="107000"/>
+                        </a:lnSpc>
+                        <a:spcAft>
+                          <a:spcPts val="800"/>
+                        </a:spcAft>
+                      </a:pPr>
+                      <a:endParaRPr lang="en-US" sz="2800" dirty="0">
+                        <a:effectLst/>
+                        <a:highlight>
+                          <a:srgbClr val="5B9BD5"/>
+                        </a:highlight>
+                        <a:latin typeface="Calibri" panose="020F0502020204030204" pitchFamily="34" charset="0"/>
+                        <a:ea typeface="Calibri" panose="020F0502020204030204" pitchFamily="34" charset="0"/>
+                        <a:cs typeface="Times New Roman" panose="02020603050405020304" pitchFamily="18" charset="0"/>
+                      </a:endParaRPr>
+                    </a:p>
+                  </a:txBody>
+                  <a:tcPr marL="68580" marR="68580" marT="0" marB="0" anchor="b">
+                    <a:lnL w="12700" cap="flat" cmpd="sng" algn="ctr">
+                      <a:solidFill>
+                        <a:srgbClr val="5B9BD5"/>
+                      </a:solidFill>
+                      <a:prstDash val="solid"/>
+                      <a:round/>
+                      <a:headEnd type="none" w="med" len="med"/>
+                      <a:tailEnd type="none" w="med" len="med"/>
+                    </a:lnL>
+                    <a:lnR w="12700" cap="flat" cmpd="sng" algn="ctr">
+                      <a:solidFill>
+                        <a:srgbClr val="5B9BD5"/>
+                      </a:solidFill>
+                      <a:prstDash val="solid"/>
+                      <a:round/>
+                      <a:headEnd type="none" w="med" len="med"/>
+                      <a:tailEnd type="none" w="med" len="med"/>
+                    </a:lnR>
+                    <a:lnT w="12700" cap="flat" cmpd="sng" algn="ctr">
+                      <a:solidFill>
+                        <a:srgbClr val="5B9BD5"/>
+                      </a:solidFill>
+                      <a:prstDash val="solid"/>
+                      <a:round/>
+                      <a:headEnd type="none" w="med" len="med"/>
+                      <a:tailEnd type="none" w="med" len="med"/>
+                    </a:lnT>
+                    <a:lnB w="12700" cap="flat" cmpd="sng" algn="ctr">
+                      <a:solidFill>
+                        <a:srgbClr val="5B9BD5"/>
+                      </a:solidFill>
+                      <a:prstDash val="solid"/>
+                      <a:round/>
+                      <a:headEnd type="none" w="med" len="med"/>
+                      <a:tailEnd type="none" w="med" len="med"/>
+                    </a:lnB>
+                    <a:solidFill>
+                      <a:srgbClr val="5B9BD5"/>
+                    </a:solidFill>
+                  </a:tcPr>
+                </a:tc>
+                <a:extLst>
+                  <a:ext uri="{0D108BD9-81ED-4DB2-BD59-A6C34878D82A}">
+                    <a16:rowId xmlns:a16="http://schemas.microsoft.com/office/drawing/2014/main" val="3648477704"/>
+                  </a:ext>
+                </a:extLst>
+              </a:tr>
+              <a:tr h="399980">
+                <a:tc>
+                  <a:txBody>
+                    <a:bodyPr/>
+                    <a:lstStyle/>
+                    <a:p>
+                      <a:pPr algn="l">
+                        <a:lnSpc>
+                          <a:spcPct val="107000"/>
+                        </a:lnSpc>
+                        <a:spcAft>
+                          <a:spcPts val="800"/>
+                        </a:spcAft>
+                      </a:pPr>
+                      <a:r>
+                        <a:rPr lang="en-GB" sz="2800" b="1">
+                          <a:solidFill>
+                            <a:srgbClr val="FFFFFF"/>
+                          </a:solidFill>
+                          <a:effectLst/>
+                          <a:highlight>
+                            <a:srgbClr val="5B9BD5"/>
+                          </a:highlight>
+                          <a:latin typeface="Arrow narrow"/>
+                          <a:ea typeface="Times New Roman" panose="02020603050405020304" pitchFamily="18" charset="0"/>
+                          <a:cs typeface="Times New Roman" panose="02020603050405020304" pitchFamily="18" charset="0"/>
+                        </a:rPr>
+                        <a:t>Ν</a:t>
+                      </a:r>
+                      <a:endParaRPr lang="en-US" sz="2800">
+                        <a:effectLst/>
+                        <a:highlight>
+                          <a:srgbClr val="5B9BD5"/>
+                        </a:highlight>
+                        <a:latin typeface="Calibri" panose="020F0502020204030204" pitchFamily="34" charset="0"/>
+                        <a:ea typeface="Calibri" panose="020F0502020204030204" pitchFamily="34" charset="0"/>
+                        <a:cs typeface="Times New Roman" panose="02020603050405020304" pitchFamily="18" charset="0"/>
+                      </a:endParaRPr>
+                    </a:p>
+                  </a:txBody>
+                  <a:tcPr marL="68580" marR="68580" marT="0" marB="0" anchor="b">
+                    <a:lnL w="12700" cap="flat" cmpd="sng" algn="ctr">
+                      <a:solidFill>
+                        <a:srgbClr val="A2C6E7"/>
+                      </a:solidFill>
+                      <a:prstDash val="solid"/>
+                      <a:round/>
+                      <a:headEnd type="none" w="med" len="med"/>
+                      <a:tailEnd type="none" w="med" len="med"/>
+                    </a:lnL>
+                    <a:lnR w="12700" cap="flat" cmpd="sng" algn="ctr">
+                      <a:solidFill>
+                        <a:srgbClr val="A2C6E7"/>
+                      </a:solidFill>
+                      <a:prstDash val="solid"/>
+                      <a:round/>
+                      <a:headEnd type="none" w="med" len="med"/>
+                      <a:tailEnd type="none" w="med" len="med"/>
+                    </a:lnR>
+                    <a:lnT w="12700" cap="flat" cmpd="sng" algn="ctr">
+                      <a:solidFill>
+                        <a:srgbClr val="5B9BD5"/>
+                      </a:solidFill>
+                      <a:prstDash val="solid"/>
+                      <a:round/>
+                      <a:headEnd type="none" w="med" len="med"/>
+                      <a:tailEnd type="none" w="med" len="med"/>
+                    </a:lnT>
+                    <a:lnB w="12700" cap="flat" cmpd="sng" algn="ctr">
+                      <a:solidFill>
+                        <a:srgbClr val="A2C6E7"/>
+                      </a:solidFill>
+                      <a:prstDash val="solid"/>
+                      <a:round/>
+                      <a:headEnd type="none" w="med" len="med"/>
+                      <a:tailEnd type="none" w="med" len="med"/>
+                    </a:lnB>
+                    <a:solidFill>
+                      <a:srgbClr val="5B9BD5"/>
+                    </a:solidFill>
+                  </a:tcPr>
+                </a:tc>
+                <a:tc>
+                  <a:txBody>
+                    <a:bodyPr/>
+                    <a:lstStyle/>
+                    <a:p>
+                      <a:pPr algn="l">
+                        <a:lnSpc>
+                          <a:spcPct val="107000"/>
+                        </a:lnSpc>
+                        <a:spcAft>
+                          <a:spcPts val="800"/>
+                        </a:spcAft>
+                      </a:pPr>
+                      <a:r>
+                        <a:rPr lang="en-GB" sz="2800" dirty="0">
+                          <a:solidFill>
+                            <a:srgbClr val="FFFFFF"/>
+                          </a:solidFill>
+                          <a:effectLst/>
+                          <a:highlight>
+                            <a:srgbClr val="5B9BD5"/>
+                          </a:highlight>
+                          <a:latin typeface="Arrow narrow"/>
+                          <a:ea typeface="Times New Roman" panose="02020603050405020304" pitchFamily="18" charset="0"/>
+                          <a:cs typeface="Times New Roman" panose="02020603050405020304" pitchFamily="18" charset="0"/>
+                        </a:rPr>
+                        <a:t>Μ</a:t>
+                      </a:r>
+                      <a:endParaRPr lang="en-US" sz="2800" dirty="0">
+                        <a:effectLst/>
+                        <a:highlight>
+                          <a:srgbClr val="5B9BD5"/>
+                        </a:highlight>
+                        <a:latin typeface="Calibri" panose="020F0502020204030204" pitchFamily="34" charset="0"/>
+                        <a:ea typeface="Calibri" panose="020F0502020204030204" pitchFamily="34" charset="0"/>
+                        <a:cs typeface="Times New Roman" panose="02020603050405020304" pitchFamily="18" charset="0"/>
+                      </a:endParaRPr>
+                    </a:p>
+                  </a:txBody>
+                  <a:tcPr marL="68580" marR="68580" marT="0" marB="0" anchor="b">
+                    <a:lnL w="12700" cap="flat" cmpd="sng" algn="ctr">
+                      <a:solidFill>
+                        <a:srgbClr val="A2C6E7"/>
+                      </a:solidFill>
+                      <a:prstDash val="solid"/>
+                      <a:round/>
+                      <a:headEnd type="none" w="med" len="med"/>
+                      <a:tailEnd type="none" w="med" len="med"/>
+                    </a:lnL>
+                    <a:lnR w="12700" cap="flat" cmpd="sng" algn="ctr">
+                      <a:solidFill>
+                        <a:srgbClr val="A2C6E7"/>
+                      </a:solidFill>
+                      <a:prstDash val="solid"/>
+                      <a:round/>
+                      <a:headEnd type="none" w="med" len="med"/>
+                      <a:tailEnd type="none" w="med" len="med"/>
+                    </a:lnR>
+                    <a:lnT w="12700" cap="flat" cmpd="sng" algn="ctr">
+                      <a:solidFill>
+                        <a:srgbClr val="5B9BD5"/>
+                      </a:solidFill>
+                      <a:prstDash val="solid"/>
+                      <a:round/>
+                      <a:headEnd type="none" w="med" len="med"/>
+                      <a:tailEnd type="none" w="med" len="med"/>
+                    </a:lnT>
+                    <a:lnB w="12700" cap="flat" cmpd="sng" algn="ctr">
+                      <a:solidFill>
+                        <a:srgbClr val="A2C6E7"/>
+                      </a:solidFill>
+                      <a:prstDash val="solid"/>
+                      <a:round/>
+                      <a:headEnd type="none" w="med" len="med"/>
+                      <a:tailEnd type="none" w="med" len="med"/>
+                    </a:lnB>
+                    <a:solidFill>
+                      <a:srgbClr val="5B9BD5"/>
+                    </a:solidFill>
+                  </a:tcPr>
+                </a:tc>
+                <a:tc>
+                  <a:txBody>
+                    <a:bodyPr/>
+                    <a:lstStyle/>
+                    <a:p>
+                      <a:pPr algn="l">
+                        <a:lnSpc>
+                          <a:spcPct val="107000"/>
+                        </a:lnSpc>
+                        <a:spcAft>
+                          <a:spcPts val="800"/>
+                        </a:spcAft>
+                      </a:pPr>
+                      <a:r>
+                        <a:rPr lang="en-GB" sz="2800" dirty="0">
+                          <a:solidFill>
+                            <a:srgbClr val="000000"/>
+                          </a:solidFill>
+                          <a:effectLst/>
+                          <a:highlight>
+                            <a:srgbClr val="DDEAF6"/>
+                          </a:highlight>
+                          <a:latin typeface="Arrow narrow"/>
+                          <a:ea typeface="Times New Roman" panose="02020603050405020304" pitchFamily="18" charset="0"/>
+                          <a:cs typeface="Times New Roman" panose="02020603050405020304" pitchFamily="18" charset="0"/>
+                        </a:rPr>
+                        <a:t>x86</a:t>
+                      </a:r>
+                      <a:endParaRPr lang="en-US" sz="2800" dirty="0">
+                        <a:effectLst/>
+                        <a:highlight>
+                          <a:srgbClr val="DDEAF6"/>
+                        </a:highlight>
+                        <a:latin typeface="Calibri" panose="020F0502020204030204" pitchFamily="34" charset="0"/>
+                        <a:ea typeface="Calibri" panose="020F0502020204030204" pitchFamily="34" charset="0"/>
+                        <a:cs typeface="Times New Roman" panose="02020603050405020304" pitchFamily="18" charset="0"/>
+                      </a:endParaRPr>
+                    </a:p>
+                  </a:txBody>
+                  <a:tcPr marL="68580" marR="68580" marT="0" marB="0" anchor="b">
+                    <a:lnL w="12700" cap="flat" cmpd="sng" algn="ctr">
+                      <a:solidFill>
+                        <a:srgbClr val="A2C6E7"/>
+                      </a:solidFill>
+                      <a:prstDash val="solid"/>
+                      <a:round/>
+                      <a:headEnd type="none" w="med" len="med"/>
+                      <a:tailEnd type="none" w="med" len="med"/>
+                    </a:lnL>
+                    <a:lnR w="12700" cap="flat" cmpd="sng" algn="ctr">
+                      <a:solidFill>
+                        <a:srgbClr val="A2C6E7"/>
+                      </a:solidFill>
+                      <a:prstDash val="solid"/>
+                      <a:round/>
+                      <a:headEnd type="none" w="med" len="med"/>
+                      <a:tailEnd type="none" w="med" len="med"/>
+                    </a:lnR>
+                    <a:lnT w="12700" cap="flat" cmpd="sng" algn="ctr">
+                      <a:solidFill>
+                        <a:srgbClr val="5B9BD5"/>
+                      </a:solidFill>
+                      <a:prstDash val="solid"/>
+                      <a:round/>
+                      <a:headEnd type="none" w="med" len="med"/>
+                      <a:tailEnd type="none" w="med" len="med"/>
+                    </a:lnT>
+                    <a:lnB w="12700" cap="flat" cmpd="sng" algn="ctr">
+                      <a:solidFill>
+                        <a:srgbClr val="A2C6E7"/>
+                      </a:solidFill>
+                      <a:prstDash val="solid"/>
+                      <a:round/>
+                      <a:headEnd type="none" w="med" len="med"/>
+                      <a:tailEnd type="none" w="med" len="med"/>
+                    </a:lnB>
+                    <a:solidFill>
+                      <a:srgbClr val="DDEAF6"/>
+                    </a:solidFill>
+                  </a:tcPr>
+                </a:tc>
+                <a:tc>
+                  <a:txBody>
+                    <a:bodyPr/>
+                    <a:lstStyle/>
+                    <a:p>
+                      <a:pPr algn="l">
+                        <a:lnSpc>
+                          <a:spcPct val="107000"/>
+                        </a:lnSpc>
+                        <a:spcAft>
+                          <a:spcPts val="800"/>
+                        </a:spcAft>
+                      </a:pPr>
+                      <a:r>
+                        <a:rPr lang="en-GB" sz="2800" dirty="0">
+                          <a:solidFill>
+                            <a:srgbClr val="000000"/>
+                          </a:solidFill>
+                          <a:effectLst/>
+                          <a:highlight>
+                            <a:srgbClr val="DDEAF6"/>
+                          </a:highlight>
+                          <a:latin typeface="Arrow narrow"/>
+                          <a:ea typeface="Times New Roman" panose="02020603050405020304" pitchFamily="18" charset="0"/>
+                          <a:cs typeface="Times New Roman" panose="02020603050405020304" pitchFamily="18" charset="0"/>
+                        </a:rPr>
+                        <a:t>FPGA</a:t>
+                      </a:r>
+                      <a:endParaRPr lang="en-US" sz="2800" dirty="0">
+                        <a:effectLst/>
+                        <a:highlight>
+                          <a:srgbClr val="DDEAF6"/>
+                        </a:highlight>
+                        <a:latin typeface="Calibri" panose="020F0502020204030204" pitchFamily="34" charset="0"/>
+                        <a:ea typeface="Calibri" panose="020F0502020204030204" pitchFamily="34" charset="0"/>
+                        <a:cs typeface="Times New Roman" panose="02020603050405020304" pitchFamily="18" charset="0"/>
+                      </a:endParaRPr>
+                    </a:p>
+                  </a:txBody>
+                  <a:tcPr marL="68580" marR="68580" marT="0" marB="0" anchor="b">
+                    <a:lnL w="12700" cap="flat" cmpd="sng" algn="ctr">
+                      <a:solidFill>
+                        <a:srgbClr val="A2C6E7"/>
+                      </a:solidFill>
+                      <a:prstDash val="solid"/>
+                      <a:round/>
+                      <a:headEnd type="none" w="med" len="med"/>
+                      <a:tailEnd type="none" w="med" len="med"/>
+                    </a:lnL>
+                    <a:lnR w="12700" cap="flat" cmpd="sng" algn="ctr">
+                      <a:solidFill>
+                        <a:srgbClr val="A2C6E7"/>
+                      </a:solidFill>
+                      <a:prstDash val="solid"/>
+                      <a:round/>
+                      <a:headEnd type="none" w="med" len="med"/>
+                      <a:tailEnd type="none" w="med" len="med"/>
+                    </a:lnR>
+                    <a:lnT w="12700" cap="flat" cmpd="sng" algn="ctr">
+                      <a:solidFill>
+                        <a:srgbClr val="5B9BD5"/>
+                      </a:solidFill>
+                      <a:prstDash val="solid"/>
+                      <a:round/>
+                      <a:headEnd type="none" w="med" len="med"/>
+                      <a:tailEnd type="none" w="med" len="med"/>
+                    </a:lnT>
+                    <a:lnB w="12700" cap="flat" cmpd="sng" algn="ctr">
+                      <a:solidFill>
+                        <a:srgbClr val="A2C6E7"/>
+                      </a:solidFill>
+                      <a:prstDash val="solid"/>
+                      <a:round/>
+                      <a:headEnd type="none" w="med" len="med"/>
+                      <a:tailEnd type="none" w="med" len="med"/>
+                    </a:lnB>
+                    <a:solidFill>
+                      <a:srgbClr val="DDEAF6"/>
+                    </a:solidFill>
+                  </a:tcPr>
+                </a:tc>
+                <a:extLst>
+                  <a:ext uri="{0D108BD9-81ED-4DB2-BD59-A6C34878D82A}">
+                    <a16:rowId xmlns:a16="http://schemas.microsoft.com/office/drawing/2014/main" val="4140372107"/>
+                  </a:ext>
+                </a:extLst>
+              </a:tr>
+              <a:tr h="481597">
+                <a:tc>
+                  <a:txBody>
+                    <a:bodyPr/>
+                    <a:lstStyle/>
+                    <a:p>
+                      <a:pPr algn="l">
+                        <a:lnSpc>
+                          <a:spcPct val="107000"/>
+                        </a:lnSpc>
+                        <a:spcAft>
+                          <a:spcPts val="800"/>
+                        </a:spcAft>
+                      </a:pPr>
+                      <a:r>
+                        <a:rPr lang="en-GB" sz="2800" b="1">
+                          <a:solidFill>
+                            <a:srgbClr val="FFFFFF"/>
+                          </a:solidFill>
+                          <a:effectLst/>
+                          <a:highlight>
+                            <a:srgbClr val="5B9BD5"/>
+                          </a:highlight>
+                          <a:latin typeface="Arrow narrow"/>
+                          <a:ea typeface="Times New Roman" panose="02020603050405020304" pitchFamily="18" charset="0"/>
+                          <a:cs typeface="Times New Roman" panose="02020603050405020304" pitchFamily="18" charset="0"/>
+                        </a:rPr>
+                        <a:t>32</a:t>
+                      </a:r>
+                      <a:endParaRPr lang="en-US" sz="2800">
+                        <a:effectLst/>
+                        <a:highlight>
+                          <a:srgbClr val="5B9BD5"/>
+                        </a:highlight>
+                        <a:latin typeface="Calibri" panose="020F0502020204030204" pitchFamily="34" charset="0"/>
+                        <a:ea typeface="Calibri" panose="020F0502020204030204" pitchFamily="34" charset="0"/>
+                        <a:cs typeface="Times New Roman" panose="02020603050405020304" pitchFamily="18" charset="0"/>
+                      </a:endParaRPr>
+                    </a:p>
+                  </a:txBody>
+                  <a:tcPr marL="68580" marR="68580" marT="0" marB="0" anchor="b">
+                    <a:lnL w="12700" cap="flat" cmpd="sng" algn="ctr">
+                      <a:solidFill>
+                        <a:srgbClr val="A2C6E7"/>
+                      </a:solidFill>
+                      <a:prstDash val="solid"/>
+                      <a:round/>
+                      <a:headEnd type="none" w="med" len="med"/>
+                      <a:tailEnd type="none" w="med" len="med"/>
+                    </a:lnL>
+                    <a:lnR w="12700" cap="flat" cmpd="sng" algn="ctr">
+                      <a:solidFill>
+                        <a:srgbClr val="A2C6E7"/>
+                      </a:solidFill>
+                      <a:prstDash val="solid"/>
+                      <a:round/>
+                      <a:headEnd type="none" w="med" len="med"/>
+                      <a:tailEnd type="none" w="med" len="med"/>
+                    </a:lnR>
+                    <a:lnT w="12700" cap="flat" cmpd="sng" algn="ctr">
+                      <a:solidFill>
+                        <a:srgbClr val="A2C6E7"/>
+                      </a:solidFill>
+                      <a:prstDash val="solid"/>
+                      <a:round/>
+                      <a:headEnd type="none" w="med" len="med"/>
+                      <a:tailEnd type="none" w="med" len="med"/>
+                    </a:lnT>
+                    <a:lnB w="12700" cap="flat" cmpd="sng" algn="ctr">
+                      <a:solidFill>
+                        <a:srgbClr val="A2C6E7"/>
+                      </a:solidFill>
+                      <a:prstDash val="solid"/>
+                      <a:round/>
+                      <a:headEnd type="none" w="med" len="med"/>
+                      <a:tailEnd type="none" w="med" len="med"/>
+                    </a:lnB>
+                    <a:solidFill>
+                      <a:srgbClr val="5B9BD5"/>
+                    </a:solidFill>
+                  </a:tcPr>
+                </a:tc>
+                <a:tc>
+                  <a:txBody>
+                    <a:bodyPr/>
+                    <a:lstStyle/>
+                    <a:p>
+                      <a:pPr algn="l">
+                        <a:lnSpc>
+                          <a:spcPct val="107000"/>
+                        </a:lnSpc>
+                        <a:spcAft>
+                          <a:spcPts val="800"/>
+                        </a:spcAft>
+                      </a:pPr>
+                      <a:r>
+                        <a:rPr lang="en-GB" sz="2800" dirty="0">
+                          <a:solidFill>
+                            <a:srgbClr val="FFFFFF"/>
+                          </a:solidFill>
+                          <a:effectLst/>
+                          <a:highlight>
+                            <a:srgbClr val="5B9BD5"/>
+                          </a:highlight>
+                          <a:latin typeface="Arrow narrow"/>
+                          <a:ea typeface="Times New Roman" panose="02020603050405020304" pitchFamily="18" charset="0"/>
+                          <a:cs typeface="Times New Roman" panose="02020603050405020304" pitchFamily="18" charset="0"/>
+                        </a:rPr>
+                        <a:t>32</a:t>
+                      </a:r>
+                      <a:endParaRPr lang="en-US" sz="2800" dirty="0">
+                        <a:effectLst/>
+                        <a:highlight>
+                          <a:srgbClr val="5B9BD5"/>
+                        </a:highlight>
+                        <a:latin typeface="Calibri" panose="020F0502020204030204" pitchFamily="34" charset="0"/>
+                        <a:ea typeface="Calibri" panose="020F0502020204030204" pitchFamily="34" charset="0"/>
+                        <a:cs typeface="Times New Roman" panose="02020603050405020304" pitchFamily="18" charset="0"/>
+                      </a:endParaRPr>
+                    </a:p>
+                  </a:txBody>
+                  <a:tcPr marL="68580" marR="68580" marT="0" marB="0" anchor="b">
+                    <a:lnL w="12700" cap="flat" cmpd="sng" algn="ctr">
+                      <a:solidFill>
+                        <a:srgbClr val="A2C6E7"/>
+                      </a:solidFill>
+                      <a:prstDash val="solid"/>
+                      <a:round/>
+                      <a:headEnd type="none" w="med" len="med"/>
+                      <a:tailEnd type="none" w="med" len="med"/>
+                    </a:lnL>
+                    <a:lnR w="12700" cap="flat" cmpd="sng" algn="ctr">
+                      <a:solidFill>
+                        <a:srgbClr val="A2C6E7"/>
+                      </a:solidFill>
+                      <a:prstDash val="solid"/>
+                      <a:round/>
+                      <a:headEnd type="none" w="med" len="med"/>
+                      <a:tailEnd type="none" w="med" len="med"/>
+                    </a:lnR>
+                    <a:lnT w="12700" cap="flat" cmpd="sng" algn="ctr">
+                      <a:solidFill>
+                        <a:srgbClr val="A2C6E7"/>
+                      </a:solidFill>
+                      <a:prstDash val="solid"/>
+                      <a:round/>
+                      <a:headEnd type="none" w="med" len="med"/>
+                      <a:tailEnd type="none" w="med" len="med"/>
+                    </a:lnT>
+                    <a:lnB w="12700" cap="flat" cmpd="sng" algn="ctr">
+                      <a:solidFill>
+                        <a:srgbClr val="A2C6E7"/>
+                      </a:solidFill>
+                      <a:prstDash val="solid"/>
+                      <a:round/>
+                      <a:headEnd type="none" w="med" len="med"/>
+                      <a:tailEnd type="none" w="med" len="med"/>
+                    </a:lnB>
+                    <a:solidFill>
+                      <a:srgbClr val="5B9BD5"/>
+                    </a:solidFill>
+                  </a:tcPr>
+                </a:tc>
+                <a:tc>
+                  <a:txBody>
+                    <a:bodyPr/>
+                    <a:lstStyle/>
+                    <a:p>
+                      <a:pPr algn="l">
+                        <a:lnSpc>
+                          <a:spcPct val="107000"/>
+                        </a:lnSpc>
+                        <a:spcAft>
+                          <a:spcPts val="800"/>
+                        </a:spcAft>
+                      </a:pPr>
+                      <a:r>
+                        <a:rPr lang="el-GR" sz="2800" dirty="0">
+                          <a:effectLst/>
+                          <a:latin typeface="Arrow narrow"/>
+                          <a:ea typeface="Calibri" panose="020F0502020204030204" pitchFamily="34" charset="0"/>
+                          <a:cs typeface="Times New Roman" panose="02020603050405020304" pitchFamily="18" charset="0"/>
+                        </a:rPr>
+                        <a:t>0.00002</a:t>
+                      </a:r>
+                      <a:endParaRPr lang="en-US" sz="2800" dirty="0">
+                        <a:effectLst/>
+                        <a:latin typeface="Calibri" panose="020F0502020204030204" pitchFamily="34" charset="0"/>
+                        <a:ea typeface="Calibri" panose="020F0502020204030204" pitchFamily="34" charset="0"/>
+                        <a:cs typeface="Times New Roman" panose="02020603050405020304" pitchFamily="18" charset="0"/>
+                      </a:endParaRPr>
+                    </a:p>
+                  </a:txBody>
+                  <a:tcPr marL="68580" marR="68580" marT="0" marB="0" anchor="b">
+                    <a:lnL w="12700" cap="flat" cmpd="sng" algn="ctr">
+                      <a:solidFill>
+                        <a:srgbClr val="A2C6E7"/>
+                      </a:solidFill>
+                      <a:prstDash val="solid"/>
+                      <a:round/>
+                      <a:headEnd type="none" w="med" len="med"/>
+                      <a:tailEnd type="none" w="med" len="med"/>
+                    </a:lnL>
+                    <a:lnR w="12700" cap="flat" cmpd="sng" algn="ctr">
+                      <a:solidFill>
+                        <a:srgbClr val="A2C6E7"/>
+                      </a:solidFill>
+                      <a:prstDash val="solid"/>
+                      <a:round/>
+                      <a:headEnd type="none" w="med" len="med"/>
+                      <a:tailEnd type="none" w="med" len="med"/>
+                    </a:lnR>
+                    <a:lnT w="12700" cap="flat" cmpd="sng" algn="ctr">
+                      <a:solidFill>
+                        <a:srgbClr val="A2C6E7"/>
+                      </a:solidFill>
+                      <a:prstDash val="solid"/>
+                      <a:round/>
+                      <a:headEnd type="none" w="med" len="med"/>
+                      <a:tailEnd type="none" w="med" len="med"/>
+                    </a:lnT>
+                    <a:lnB w="12700" cap="flat" cmpd="sng" algn="ctr">
+                      <a:solidFill>
+                        <a:srgbClr val="A2C6E7"/>
+                      </a:solidFill>
+                      <a:prstDash val="solid"/>
+                      <a:round/>
+                      <a:headEnd type="none" w="med" len="med"/>
+                      <a:tailEnd type="none" w="med" len="med"/>
+                    </a:lnB>
+                    <a:noFill/>
+                  </a:tcPr>
+                </a:tc>
+                <a:tc>
+                  <a:txBody>
+                    <a:bodyPr/>
+                    <a:lstStyle/>
+                    <a:p>
+                      <a:pPr algn="l">
+                        <a:lnSpc>
+                          <a:spcPct val="107000"/>
+                        </a:lnSpc>
+                        <a:spcAft>
+                          <a:spcPts val="800"/>
+                        </a:spcAft>
+                      </a:pPr>
+                      <a:r>
+                        <a:rPr lang="el-GR" sz="2800" dirty="0">
+                          <a:effectLst/>
+                          <a:latin typeface="Arrow narrow"/>
+                          <a:ea typeface="Calibri" panose="020F0502020204030204" pitchFamily="34" charset="0"/>
+                          <a:cs typeface="Times New Roman" panose="02020603050405020304" pitchFamily="18" charset="0"/>
+                        </a:rPr>
+                        <a:t>0.0008173</a:t>
+                      </a:r>
+                      <a:endParaRPr lang="en-US" sz="2800" dirty="0">
+                        <a:effectLst/>
+                        <a:latin typeface="Calibri" panose="020F0502020204030204" pitchFamily="34" charset="0"/>
+                        <a:ea typeface="Calibri" panose="020F0502020204030204" pitchFamily="34" charset="0"/>
+                        <a:cs typeface="Times New Roman" panose="02020603050405020304" pitchFamily="18" charset="0"/>
+                      </a:endParaRPr>
+                    </a:p>
+                  </a:txBody>
+                  <a:tcPr marL="68580" marR="68580" marT="0" marB="0">
+                    <a:lnL w="12700" cap="flat" cmpd="sng" algn="ctr">
+                      <a:solidFill>
+                        <a:srgbClr val="A2C6E7"/>
+                      </a:solidFill>
+                      <a:prstDash val="solid"/>
+                      <a:round/>
+                      <a:headEnd type="none" w="med" len="med"/>
+                      <a:tailEnd type="none" w="med" len="med"/>
+                    </a:lnL>
+                    <a:lnR w="12700" cap="flat" cmpd="sng" algn="ctr">
+                      <a:solidFill>
+                        <a:srgbClr val="A2C6E7"/>
+                      </a:solidFill>
+                      <a:prstDash val="solid"/>
+                      <a:round/>
+                      <a:headEnd type="none" w="med" len="med"/>
+                      <a:tailEnd type="none" w="med" len="med"/>
+                    </a:lnR>
+                    <a:lnT w="12700" cap="flat" cmpd="sng" algn="ctr">
+                      <a:solidFill>
+                        <a:srgbClr val="A2C6E7"/>
+                      </a:solidFill>
+                      <a:prstDash val="solid"/>
+                      <a:round/>
+                      <a:headEnd type="none" w="med" len="med"/>
+                      <a:tailEnd type="none" w="med" len="med"/>
+                    </a:lnT>
+                    <a:lnB w="12700" cap="flat" cmpd="sng" algn="ctr">
+                      <a:solidFill>
+                        <a:srgbClr val="A2C6E7"/>
+                      </a:solidFill>
+                      <a:prstDash val="solid"/>
+                      <a:round/>
+                      <a:headEnd type="none" w="med" len="med"/>
+                      <a:tailEnd type="none" w="med" len="med"/>
+                    </a:lnB>
+                    <a:noFill/>
+                  </a:tcPr>
+                </a:tc>
+                <a:extLst>
+                  <a:ext uri="{0D108BD9-81ED-4DB2-BD59-A6C34878D82A}">
+                    <a16:rowId xmlns:a16="http://schemas.microsoft.com/office/drawing/2014/main" val="2873588949"/>
+                  </a:ext>
+                </a:extLst>
+              </a:tr>
+              <a:tr h="399980">
+                <a:tc>
+                  <a:txBody>
+                    <a:bodyPr/>
+                    <a:lstStyle/>
+                    <a:p>
+                      <a:pPr algn="l">
+                        <a:lnSpc>
+                          <a:spcPct val="107000"/>
+                        </a:lnSpc>
+                        <a:spcAft>
+                          <a:spcPts val="800"/>
+                        </a:spcAft>
+                      </a:pPr>
+                      <a:r>
+                        <a:rPr lang="en-GB" sz="2800" b="1">
+                          <a:solidFill>
+                            <a:srgbClr val="FFFFFF"/>
+                          </a:solidFill>
+                          <a:effectLst/>
+                          <a:highlight>
+                            <a:srgbClr val="5B9BD5"/>
+                          </a:highlight>
+                          <a:latin typeface="Arrow narrow"/>
+                          <a:ea typeface="Times New Roman" panose="02020603050405020304" pitchFamily="18" charset="0"/>
+                          <a:cs typeface="Times New Roman" panose="02020603050405020304" pitchFamily="18" charset="0"/>
+                        </a:rPr>
+                        <a:t>32</a:t>
+                      </a:r>
+                      <a:endParaRPr lang="en-US" sz="2800">
+                        <a:effectLst/>
+                        <a:highlight>
+                          <a:srgbClr val="5B9BD5"/>
+                        </a:highlight>
+                        <a:latin typeface="Calibri" panose="020F0502020204030204" pitchFamily="34" charset="0"/>
+                        <a:ea typeface="Calibri" panose="020F0502020204030204" pitchFamily="34" charset="0"/>
+                        <a:cs typeface="Times New Roman" panose="02020603050405020304" pitchFamily="18" charset="0"/>
+                      </a:endParaRPr>
+                    </a:p>
+                  </a:txBody>
+                  <a:tcPr marL="68580" marR="68580" marT="0" marB="0" anchor="b">
+                    <a:lnL w="12700" cap="flat" cmpd="sng" algn="ctr">
+                      <a:solidFill>
+                        <a:srgbClr val="A2C6E7"/>
+                      </a:solidFill>
+                      <a:prstDash val="solid"/>
+                      <a:round/>
+                      <a:headEnd type="none" w="med" len="med"/>
+                      <a:tailEnd type="none" w="med" len="med"/>
+                    </a:lnL>
+                    <a:lnR w="12700" cap="flat" cmpd="sng" algn="ctr">
+                      <a:solidFill>
+                        <a:srgbClr val="A2C6E7"/>
+                      </a:solidFill>
+                      <a:prstDash val="solid"/>
+                      <a:round/>
+                      <a:headEnd type="none" w="med" len="med"/>
+                      <a:tailEnd type="none" w="med" len="med"/>
+                    </a:lnR>
+                    <a:lnT w="12700" cap="flat" cmpd="sng" algn="ctr">
+                      <a:solidFill>
+                        <a:srgbClr val="A2C6E7"/>
+                      </a:solidFill>
+                      <a:prstDash val="solid"/>
+                      <a:round/>
+                      <a:headEnd type="none" w="med" len="med"/>
+                      <a:tailEnd type="none" w="med" len="med"/>
+                    </a:lnT>
+                    <a:lnB w="12700" cap="flat" cmpd="sng" algn="ctr">
+                      <a:solidFill>
+                        <a:srgbClr val="A2C6E7"/>
+                      </a:solidFill>
+                      <a:prstDash val="solid"/>
+                      <a:round/>
+                      <a:headEnd type="none" w="med" len="med"/>
+                      <a:tailEnd type="none" w="med" len="med"/>
+                    </a:lnB>
+                    <a:solidFill>
+                      <a:srgbClr val="5B9BD5"/>
+                    </a:solidFill>
+                  </a:tcPr>
+                </a:tc>
+                <a:tc>
+                  <a:txBody>
+                    <a:bodyPr/>
+                    <a:lstStyle/>
+                    <a:p>
+                      <a:pPr algn="l">
+                        <a:lnSpc>
+                          <a:spcPct val="107000"/>
+                        </a:lnSpc>
+                        <a:spcAft>
+                          <a:spcPts val="800"/>
+                        </a:spcAft>
+                      </a:pPr>
+                      <a:r>
+                        <a:rPr lang="en-GB" sz="2800">
+                          <a:solidFill>
+                            <a:srgbClr val="FFFFFF"/>
+                          </a:solidFill>
+                          <a:effectLst/>
+                          <a:highlight>
+                            <a:srgbClr val="5B9BD5"/>
+                          </a:highlight>
+                          <a:latin typeface="Arrow narrow"/>
+                          <a:ea typeface="Times New Roman" panose="02020603050405020304" pitchFamily="18" charset="0"/>
+                          <a:cs typeface="Times New Roman" panose="02020603050405020304" pitchFamily="18" charset="0"/>
+                        </a:rPr>
+                        <a:t>65536</a:t>
+                      </a:r>
+                      <a:endParaRPr lang="en-US" sz="2800">
+                        <a:effectLst/>
+                        <a:highlight>
+                          <a:srgbClr val="5B9BD5"/>
+                        </a:highlight>
+                        <a:latin typeface="Calibri" panose="020F0502020204030204" pitchFamily="34" charset="0"/>
+                        <a:ea typeface="Calibri" panose="020F0502020204030204" pitchFamily="34" charset="0"/>
+                        <a:cs typeface="Times New Roman" panose="02020603050405020304" pitchFamily="18" charset="0"/>
+                      </a:endParaRPr>
+                    </a:p>
+                  </a:txBody>
+                  <a:tcPr marL="68580" marR="68580" marT="0" marB="0" anchor="b">
+                    <a:lnL w="12700" cap="flat" cmpd="sng" algn="ctr">
+                      <a:solidFill>
+                        <a:srgbClr val="A2C6E7"/>
+                      </a:solidFill>
+                      <a:prstDash val="solid"/>
+                      <a:round/>
+                      <a:headEnd type="none" w="med" len="med"/>
+                      <a:tailEnd type="none" w="med" len="med"/>
+                    </a:lnL>
+                    <a:lnR w="12700" cap="flat" cmpd="sng" algn="ctr">
+                      <a:solidFill>
+                        <a:srgbClr val="A2C6E7"/>
+                      </a:solidFill>
+                      <a:prstDash val="solid"/>
+                      <a:round/>
+                      <a:headEnd type="none" w="med" len="med"/>
+                      <a:tailEnd type="none" w="med" len="med"/>
+                    </a:lnR>
+                    <a:lnT w="12700" cap="flat" cmpd="sng" algn="ctr">
+                      <a:solidFill>
+                        <a:srgbClr val="A2C6E7"/>
+                      </a:solidFill>
+                      <a:prstDash val="solid"/>
+                      <a:round/>
+                      <a:headEnd type="none" w="med" len="med"/>
+                      <a:tailEnd type="none" w="med" len="med"/>
+                    </a:lnT>
+                    <a:lnB w="12700" cap="flat" cmpd="sng" algn="ctr">
+                      <a:solidFill>
+                        <a:srgbClr val="A2C6E7"/>
+                      </a:solidFill>
+                      <a:prstDash val="solid"/>
+                      <a:round/>
+                      <a:headEnd type="none" w="med" len="med"/>
+                      <a:tailEnd type="none" w="med" len="med"/>
+                    </a:lnB>
+                    <a:solidFill>
+                      <a:srgbClr val="5B9BD5"/>
+                    </a:solidFill>
+                  </a:tcPr>
+                </a:tc>
+                <a:tc>
+                  <a:txBody>
+                    <a:bodyPr/>
+                    <a:lstStyle/>
+                    <a:p>
+                      <a:pPr algn="l">
+                        <a:lnSpc>
+                          <a:spcPct val="107000"/>
+                        </a:lnSpc>
+                        <a:spcAft>
+                          <a:spcPts val="800"/>
+                        </a:spcAft>
+                      </a:pPr>
+                      <a:r>
+                        <a:rPr lang="el-GR" sz="2800" dirty="0">
+                          <a:solidFill>
+                            <a:srgbClr val="404040"/>
+                          </a:solidFill>
+                          <a:effectLst/>
+                          <a:highlight>
+                            <a:srgbClr val="DDEAF6"/>
+                          </a:highlight>
+                          <a:latin typeface="Arrow narrow"/>
+                          <a:ea typeface="Calibri" panose="020F0502020204030204" pitchFamily="34" charset="0"/>
+                          <a:cs typeface="Times New Roman" panose="02020603050405020304" pitchFamily="18" charset="0"/>
+                        </a:rPr>
+                        <a:t>0.037108</a:t>
+                      </a:r>
+                      <a:endParaRPr lang="en-US" sz="2800" dirty="0">
+                        <a:effectLst/>
+                        <a:highlight>
+                          <a:srgbClr val="DDEAF6"/>
+                        </a:highlight>
+                        <a:latin typeface="Calibri" panose="020F0502020204030204" pitchFamily="34" charset="0"/>
+                        <a:ea typeface="Calibri" panose="020F0502020204030204" pitchFamily="34" charset="0"/>
+                        <a:cs typeface="Times New Roman" panose="02020603050405020304" pitchFamily="18" charset="0"/>
+                      </a:endParaRPr>
+                    </a:p>
+                  </a:txBody>
+                  <a:tcPr marL="68580" marR="68580" marT="0" marB="0" anchor="b">
+                    <a:lnL w="12700" cap="flat" cmpd="sng" algn="ctr">
+                      <a:solidFill>
+                        <a:srgbClr val="A2C6E7"/>
+                      </a:solidFill>
+                      <a:prstDash val="solid"/>
+                      <a:round/>
+                      <a:headEnd type="none" w="med" len="med"/>
+                      <a:tailEnd type="none" w="med" len="med"/>
+                    </a:lnL>
+                    <a:lnR w="12700" cap="flat" cmpd="sng" algn="ctr">
+                      <a:solidFill>
+                        <a:srgbClr val="A2C6E7"/>
+                      </a:solidFill>
+                      <a:prstDash val="solid"/>
+                      <a:round/>
+                      <a:headEnd type="none" w="med" len="med"/>
+                      <a:tailEnd type="none" w="med" len="med"/>
+                    </a:lnR>
+                    <a:lnT w="12700" cap="flat" cmpd="sng" algn="ctr">
+                      <a:solidFill>
+                        <a:srgbClr val="A2C6E7"/>
+                      </a:solidFill>
+                      <a:prstDash val="solid"/>
+                      <a:round/>
+                      <a:headEnd type="none" w="med" len="med"/>
+                      <a:tailEnd type="none" w="med" len="med"/>
+                    </a:lnT>
+                    <a:lnB w="12700" cap="flat" cmpd="sng" algn="ctr">
+                      <a:solidFill>
+                        <a:srgbClr val="A2C6E7"/>
+                      </a:solidFill>
+                      <a:prstDash val="solid"/>
+                      <a:round/>
+                      <a:headEnd type="none" w="med" len="med"/>
+                      <a:tailEnd type="none" w="med" len="med"/>
+                    </a:lnB>
+                    <a:solidFill>
+                      <a:srgbClr val="DDEAF6"/>
+                    </a:solidFill>
+                  </a:tcPr>
+                </a:tc>
+                <a:tc>
+                  <a:txBody>
+                    <a:bodyPr/>
+                    <a:lstStyle/>
+                    <a:p>
+                      <a:pPr algn="l">
+                        <a:lnSpc>
+                          <a:spcPct val="107000"/>
+                        </a:lnSpc>
+                        <a:spcAft>
+                          <a:spcPts val="800"/>
+                        </a:spcAft>
+                      </a:pPr>
+                      <a:r>
+                        <a:rPr lang="el-GR" sz="2800">
+                          <a:solidFill>
+                            <a:srgbClr val="404040"/>
+                          </a:solidFill>
+                          <a:effectLst/>
+                          <a:highlight>
+                            <a:srgbClr val="DDEAF6"/>
+                          </a:highlight>
+                          <a:latin typeface="Arrow narrow"/>
+                          <a:ea typeface="Calibri" panose="020F0502020204030204" pitchFamily="34" charset="0"/>
+                          <a:cs typeface="Times New Roman" panose="02020603050405020304" pitchFamily="18" charset="0"/>
+                        </a:rPr>
+                        <a:t>0.1757924</a:t>
+                      </a:r>
+                      <a:endParaRPr lang="en-US" sz="2800">
+                        <a:effectLst/>
+                        <a:highlight>
+                          <a:srgbClr val="DDEAF6"/>
+                        </a:highlight>
+                        <a:latin typeface="Calibri" panose="020F0502020204030204" pitchFamily="34" charset="0"/>
+                        <a:ea typeface="Calibri" panose="020F0502020204030204" pitchFamily="34" charset="0"/>
+                        <a:cs typeface="Times New Roman" panose="02020603050405020304" pitchFamily="18" charset="0"/>
+                      </a:endParaRPr>
+                    </a:p>
+                  </a:txBody>
+                  <a:tcPr marL="68580" marR="68580" marT="0" marB="0">
+                    <a:lnL w="12700" cap="flat" cmpd="sng" algn="ctr">
+                      <a:solidFill>
+                        <a:srgbClr val="A2C6E7"/>
+                      </a:solidFill>
+                      <a:prstDash val="solid"/>
+                      <a:round/>
+                      <a:headEnd type="none" w="med" len="med"/>
+                      <a:tailEnd type="none" w="med" len="med"/>
+                    </a:lnL>
+                    <a:lnR w="12700" cap="flat" cmpd="sng" algn="ctr">
+                      <a:solidFill>
+                        <a:srgbClr val="A2C6E7"/>
+                      </a:solidFill>
+                      <a:prstDash val="solid"/>
+                      <a:round/>
+                      <a:headEnd type="none" w="med" len="med"/>
+                      <a:tailEnd type="none" w="med" len="med"/>
+                    </a:lnR>
+                    <a:lnT w="12700" cap="flat" cmpd="sng" algn="ctr">
+                      <a:solidFill>
+                        <a:srgbClr val="A2C6E7"/>
+                      </a:solidFill>
+                      <a:prstDash val="solid"/>
+                      <a:round/>
+                      <a:headEnd type="none" w="med" len="med"/>
+                      <a:tailEnd type="none" w="med" len="med"/>
+                    </a:lnT>
+                    <a:lnB w="12700" cap="flat" cmpd="sng" algn="ctr">
+                      <a:solidFill>
+                        <a:srgbClr val="A2C6E7"/>
+                      </a:solidFill>
+                      <a:prstDash val="solid"/>
+                      <a:round/>
+                      <a:headEnd type="none" w="med" len="med"/>
+                      <a:tailEnd type="none" w="med" len="med"/>
+                    </a:lnB>
+                    <a:solidFill>
+                      <a:srgbClr val="DDEAF6"/>
+                    </a:solidFill>
+                  </a:tcPr>
+                </a:tc>
+                <a:extLst>
+                  <a:ext uri="{0D108BD9-81ED-4DB2-BD59-A6C34878D82A}">
+                    <a16:rowId xmlns:a16="http://schemas.microsoft.com/office/drawing/2014/main" val="3746846470"/>
+                  </a:ext>
+                </a:extLst>
+              </a:tr>
+              <a:tr h="399980">
+                <a:tc>
+                  <a:txBody>
+                    <a:bodyPr/>
+                    <a:lstStyle/>
+                    <a:p>
+                      <a:pPr algn="l">
+                        <a:lnSpc>
+                          <a:spcPct val="107000"/>
+                        </a:lnSpc>
+                        <a:spcAft>
+                          <a:spcPts val="800"/>
+                        </a:spcAft>
+                      </a:pPr>
+                      <a:r>
+                        <a:rPr lang="en-GB" sz="2800" b="1">
+                          <a:solidFill>
+                            <a:srgbClr val="FFFFFF"/>
+                          </a:solidFill>
+                          <a:effectLst/>
+                          <a:highlight>
+                            <a:srgbClr val="5B9BD5"/>
+                          </a:highlight>
+                          <a:latin typeface="Arrow narrow"/>
+                          <a:ea typeface="Times New Roman" panose="02020603050405020304" pitchFamily="18" charset="0"/>
+                          <a:cs typeface="Times New Roman" panose="02020603050405020304" pitchFamily="18" charset="0"/>
+                        </a:rPr>
+                        <a:t>256</a:t>
+                      </a:r>
+                      <a:endParaRPr lang="en-US" sz="2800">
+                        <a:effectLst/>
+                        <a:highlight>
+                          <a:srgbClr val="5B9BD5"/>
+                        </a:highlight>
+                        <a:latin typeface="Calibri" panose="020F0502020204030204" pitchFamily="34" charset="0"/>
+                        <a:ea typeface="Calibri" panose="020F0502020204030204" pitchFamily="34" charset="0"/>
+                        <a:cs typeface="Times New Roman" panose="02020603050405020304" pitchFamily="18" charset="0"/>
+                      </a:endParaRPr>
+                    </a:p>
+                  </a:txBody>
+                  <a:tcPr marL="68580" marR="68580" marT="0" marB="0" anchor="b">
+                    <a:lnL w="12700" cap="flat" cmpd="sng" algn="ctr">
+                      <a:solidFill>
+                        <a:srgbClr val="A2C6E7"/>
+                      </a:solidFill>
+                      <a:prstDash val="solid"/>
+                      <a:round/>
+                      <a:headEnd type="none" w="med" len="med"/>
+                      <a:tailEnd type="none" w="med" len="med"/>
+                    </a:lnL>
+                    <a:lnR w="12700" cap="flat" cmpd="sng" algn="ctr">
+                      <a:solidFill>
+                        <a:srgbClr val="A2C6E7"/>
+                      </a:solidFill>
+                      <a:prstDash val="solid"/>
+                      <a:round/>
+                      <a:headEnd type="none" w="med" len="med"/>
+                      <a:tailEnd type="none" w="med" len="med"/>
+                    </a:lnR>
+                    <a:lnT w="12700" cap="flat" cmpd="sng" algn="ctr">
+                      <a:solidFill>
+                        <a:srgbClr val="A2C6E7"/>
+                      </a:solidFill>
+                      <a:prstDash val="solid"/>
+                      <a:round/>
+                      <a:headEnd type="none" w="med" len="med"/>
+                      <a:tailEnd type="none" w="med" len="med"/>
+                    </a:lnT>
+                    <a:lnB w="12700" cap="flat" cmpd="sng" algn="ctr">
+                      <a:solidFill>
+                        <a:srgbClr val="A2C6E7"/>
+                      </a:solidFill>
+                      <a:prstDash val="solid"/>
+                      <a:round/>
+                      <a:headEnd type="none" w="med" len="med"/>
+                      <a:tailEnd type="none" w="med" len="med"/>
+                    </a:lnB>
+                    <a:solidFill>
+                      <a:srgbClr val="5B9BD5"/>
+                    </a:solidFill>
+                  </a:tcPr>
+                </a:tc>
+                <a:tc>
+                  <a:txBody>
+                    <a:bodyPr/>
+                    <a:lstStyle/>
+                    <a:p>
+                      <a:pPr algn="l">
+                        <a:lnSpc>
+                          <a:spcPct val="107000"/>
+                        </a:lnSpc>
+                        <a:spcAft>
+                          <a:spcPts val="800"/>
+                        </a:spcAft>
+                      </a:pPr>
+                      <a:r>
+                        <a:rPr lang="en-GB" sz="2800">
+                          <a:solidFill>
+                            <a:srgbClr val="FFFFFF"/>
+                          </a:solidFill>
+                          <a:effectLst/>
+                          <a:highlight>
+                            <a:srgbClr val="5B9BD5"/>
+                          </a:highlight>
+                          <a:latin typeface="Arrow narrow"/>
+                          <a:ea typeface="Times New Roman" panose="02020603050405020304" pitchFamily="18" charset="0"/>
+                          <a:cs typeface="Times New Roman" panose="02020603050405020304" pitchFamily="18" charset="0"/>
+                        </a:rPr>
+                        <a:t>65536</a:t>
+                      </a:r>
+                      <a:endParaRPr lang="en-US" sz="2800">
+                        <a:effectLst/>
+                        <a:highlight>
+                          <a:srgbClr val="5B9BD5"/>
+                        </a:highlight>
+                        <a:latin typeface="Calibri" panose="020F0502020204030204" pitchFamily="34" charset="0"/>
+                        <a:ea typeface="Calibri" panose="020F0502020204030204" pitchFamily="34" charset="0"/>
+                        <a:cs typeface="Times New Roman" panose="02020603050405020304" pitchFamily="18" charset="0"/>
+                      </a:endParaRPr>
+                    </a:p>
+                  </a:txBody>
+                  <a:tcPr marL="68580" marR="68580" marT="0" marB="0" anchor="b">
+                    <a:lnL w="12700" cap="flat" cmpd="sng" algn="ctr">
+                      <a:solidFill>
+                        <a:srgbClr val="A2C6E7"/>
+                      </a:solidFill>
+                      <a:prstDash val="solid"/>
+                      <a:round/>
+                      <a:headEnd type="none" w="med" len="med"/>
+                      <a:tailEnd type="none" w="med" len="med"/>
+                    </a:lnL>
+                    <a:lnR w="12700" cap="flat" cmpd="sng" algn="ctr">
+                      <a:solidFill>
+                        <a:srgbClr val="A2C6E7"/>
+                      </a:solidFill>
+                      <a:prstDash val="solid"/>
+                      <a:round/>
+                      <a:headEnd type="none" w="med" len="med"/>
+                      <a:tailEnd type="none" w="med" len="med"/>
+                    </a:lnR>
+                    <a:lnT w="12700" cap="flat" cmpd="sng" algn="ctr">
+                      <a:solidFill>
+                        <a:srgbClr val="A2C6E7"/>
+                      </a:solidFill>
+                      <a:prstDash val="solid"/>
+                      <a:round/>
+                      <a:headEnd type="none" w="med" len="med"/>
+                      <a:tailEnd type="none" w="med" len="med"/>
+                    </a:lnT>
+                    <a:lnB w="12700" cap="flat" cmpd="sng" algn="ctr">
+                      <a:solidFill>
+                        <a:srgbClr val="A2C6E7"/>
+                      </a:solidFill>
+                      <a:prstDash val="solid"/>
+                      <a:round/>
+                      <a:headEnd type="none" w="med" len="med"/>
+                      <a:tailEnd type="none" w="med" len="med"/>
+                    </a:lnB>
+                    <a:solidFill>
+                      <a:srgbClr val="5B9BD5"/>
+                    </a:solidFill>
+                  </a:tcPr>
+                </a:tc>
+                <a:tc>
+                  <a:txBody>
+                    <a:bodyPr/>
+                    <a:lstStyle/>
+                    <a:p>
+                      <a:pPr algn="l">
+                        <a:lnSpc>
+                          <a:spcPct val="107000"/>
+                        </a:lnSpc>
+                        <a:spcAft>
+                          <a:spcPts val="800"/>
+                        </a:spcAft>
+                      </a:pPr>
+                      <a:r>
+                        <a:rPr lang="el-GR" sz="2800">
+                          <a:effectLst/>
+                          <a:latin typeface="Arrow narrow"/>
+                          <a:ea typeface="Calibri" panose="020F0502020204030204" pitchFamily="34" charset="0"/>
+                          <a:cs typeface="Times New Roman" panose="02020603050405020304" pitchFamily="18" charset="0"/>
+                        </a:rPr>
+                        <a:t>0.303335</a:t>
+                      </a:r>
+                      <a:endParaRPr lang="en-US" sz="2800">
+                        <a:effectLst/>
+                        <a:latin typeface="Calibri" panose="020F0502020204030204" pitchFamily="34" charset="0"/>
+                        <a:ea typeface="Calibri" panose="020F0502020204030204" pitchFamily="34" charset="0"/>
+                        <a:cs typeface="Times New Roman" panose="02020603050405020304" pitchFamily="18" charset="0"/>
+                      </a:endParaRPr>
+                    </a:p>
+                  </a:txBody>
+                  <a:tcPr marL="68580" marR="68580" marT="0" marB="0" anchor="b">
+                    <a:lnL w="12700" cap="flat" cmpd="sng" algn="ctr">
+                      <a:solidFill>
+                        <a:srgbClr val="A2C6E7"/>
+                      </a:solidFill>
+                      <a:prstDash val="solid"/>
+                      <a:round/>
+                      <a:headEnd type="none" w="med" len="med"/>
+                      <a:tailEnd type="none" w="med" len="med"/>
+                    </a:lnL>
+                    <a:lnR w="12700" cap="flat" cmpd="sng" algn="ctr">
+                      <a:solidFill>
+                        <a:srgbClr val="A2C6E7"/>
+                      </a:solidFill>
+                      <a:prstDash val="solid"/>
+                      <a:round/>
+                      <a:headEnd type="none" w="med" len="med"/>
+                      <a:tailEnd type="none" w="med" len="med"/>
+                    </a:lnR>
+                    <a:lnT w="12700" cap="flat" cmpd="sng" algn="ctr">
+                      <a:solidFill>
+                        <a:srgbClr val="A2C6E7"/>
+                      </a:solidFill>
+                      <a:prstDash val="solid"/>
+                      <a:round/>
+                      <a:headEnd type="none" w="med" len="med"/>
+                      <a:tailEnd type="none" w="med" len="med"/>
+                    </a:lnT>
+                    <a:lnB w="12700" cap="flat" cmpd="sng" algn="ctr">
+                      <a:solidFill>
+                        <a:srgbClr val="A2C6E7"/>
+                      </a:solidFill>
+                      <a:prstDash val="solid"/>
+                      <a:round/>
+                      <a:headEnd type="none" w="med" len="med"/>
+                      <a:tailEnd type="none" w="med" len="med"/>
+                    </a:lnB>
+                    <a:noFill/>
+                  </a:tcPr>
+                </a:tc>
+                <a:tc>
+                  <a:txBody>
+                    <a:bodyPr/>
+                    <a:lstStyle/>
+                    <a:p>
+                      <a:pPr algn="l">
+                        <a:lnSpc>
+                          <a:spcPct val="107000"/>
+                        </a:lnSpc>
+                        <a:spcAft>
+                          <a:spcPts val="800"/>
+                        </a:spcAft>
+                      </a:pPr>
+                      <a:r>
+                        <a:rPr lang="el-GR" sz="2800" dirty="0">
+                          <a:effectLst/>
+                          <a:latin typeface="Arrow narrow"/>
+                          <a:ea typeface="Calibri" panose="020F0502020204030204" pitchFamily="34" charset="0"/>
+                          <a:cs typeface="Times New Roman" panose="02020603050405020304" pitchFamily="18" charset="0"/>
+                        </a:rPr>
+                        <a:t>2.176</a:t>
+                      </a:r>
+                      <a:endParaRPr lang="en-US" sz="2800" dirty="0">
+                        <a:effectLst/>
+                        <a:latin typeface="Calibri" panose="020F0502020204030204" pitchFamily="34" charset="0"/>
+                        <a:ea typeface="Calibri" panose="020F0502020204030204" pitchFamily="34" charset="0"/>
+                        <a:cs typeface="Times New Roman" panose="02020603050405020304" pitchFamily="18" charset="0"/>
+                      </a:endParaRPr>
+                    </a:p>
+                  </a:txBody>
+                  <a:tcPr marL="68580" marR="68580" marT="0" marB="0">
+                    <a:lnL w="12700" cap="flat" cmpd="sng" algn="ctr">
+                      <a:solidFill>
+                        <a:srgbClr val="A2C6E7"/>
+                      </a:solidFill>
+                      <a:prstDash val="solid"/>
+                      <a:round/>
+                      <a:headEnd type="none" w="med" len="med"/>
+                      <a:tailEnd type="none" w="med" len="med"/>
+                    </a:lnL>
+                    <a:lnR w="12700" cap="flat" cmpd="sng" algn="ctr">
+                      <a:solidFill>
+                        <a:srgbClr val="A2C6E7"/>
+                      </a:solidFill>
+                      <a:prstDash val="solid"/>
+                      <a:round/>
+                      <a:headEnd type="none" w="med" len="med"/>
+                      <a:tailEnd type="none" w="med" len="med"/>
+                    </a:lnR>
+                    <a:lnT w="12700" cap="flat" cmpd="sng" algn="ctr">
+                      <a:solidFill>
+                        <a:srgbClr val="A2C6E7"/>
+                      </a:solidFill>
+                      <a:prstDash val="solid"/>
+                      <a:round/>
+                      <a:headEnd type="none" w="med" len="med"/>
+                      <a:tailEnd type="none" w="med" len="med"/>
+                    </a:lnT>
+                    <a:lnB w="12700" cap="flat" cmpd="sng" algn="ctr">
+                      <a:solidFill>
+                        <a:srgbClr val="A2C6E7"/>
+                      </a:solidFill>
+                      <a:prstDash val="solid"/>
+                      <a:round/>
+                      <a:headEnd type="none" w="med" len="med"/>
+                      <a:tailEnd type="none" w="med" len="med"/>
+                    </a:lnB>
+                    <a:noFill/>
+                  </a:tcPr>
+                </a:tc>
+                <a:extLst>
+                  <a:ext uri="{0D108BD9-81ED-4DB2-BD59-A6C34878D82A}">
+                    <a16:rowId xmlns:a16="http://schemas.microsoft.com/office/drawing/2014/main" val="319060849"/>
+                  </a:ext>
+                </a:extLst>
+              </a:tr>
+            </a:tbl>
+          </a:graphicData>
+        </a:graphic>
+      </p:graphicFrame>
     </p:spTree>
     <p:extLst>
       <p:ext uri="{BB962C8B-B14F-4D97-AF65-F5344CB8AC3E}">
@@ -8931,8 +10530,12 @@
           <a:lstStyle/>
           <a:p>
             <a:r>
+              <a:rPr lang="en-GB" i="1" u="sng" dirty="0"/>
+              <a:t>Goal: </a:t>
+            </a:r>
+            <a:r>
               <a:rPr lang="en-GB" dirty="0"/>
-              <a:t>Goal: Implementation of LSAL Algorithm as FPGA Accelerator</a:t>
+              <a:t>Implementation of LSAL Algorithm as FPGA Accelerator</a:t>
             </a:r>
           </a:p>
           <a:p>
@@ -8940,8 +10543,12 @@
           </a:p>
           <a:p>
             <a:r>
+              <a:rPr lang="en-GB" i="1" u="sng" dirty="0"/>
+              <a:t>Tools</a:t>
+            </a:r>
+            <a:r>
               <a:rPr lang="en-GB" dirty="0"/>
-              <a:t>Tools: </a:t>
+              <a:t>: </a:t>
             </a:r>
           </a:p>
           <a:p>
@@ -8973,6 +10580,13 @@
             <a:pPr lvl="1"/>
             <a:r>
               <a:rPr lang="en-GB" dirty="0"/>
+              <a:t>Visual Studio Code</a:t>
+            </a:r>
+          </a:p>
+          <a:p>
+            <a:pPr lvl="1"/>
+            <a:r>
+              <a:rPr lang="en-GB" dirty="0"/>
               <a:t>✨</a:t>
             </a:r>
             <a:r>
@@ -8983,6 +10597,11 @@
               <a:rPr lang="en-GB" dirty="0"/>
               <a:t> ✨</a:t>
             </a:r>
+          </a:p>
+          <a:p>
+            <a:pPr marL="457200" lvl="1" indent="0">
+              <a:buNone/>
+            </a:pPr>
             <a:endParaRPr lang="el-GR" dirty="0"/>
           </a:p>
         </p:txBody>
@@ -9069,7 +10688,11 @@
           <a:p>
             <a:r>
               <a:rPr lang="en-GB" dirty="0"/>
-              <a:t>Stands for Local Sequence Alignment Algorithm</a:t>
+              <a:t>Stands for </a:t>
+            </a:r>
+            <a:r>
+              <a:rPr lang="en-GB" i="1" dirty="0"/>
+              <a:t>Local Sequence Alignment Algorithm</a:t>
             </a:r>
           </a:p>
           <a:p>
@@ -9088,8 +10711,12 @@
           </a:p>
           <a:p>
             <a:r>
+              <a:rPr lang="en-GB" i="1" dirty="0"/>
+              <a:t>Input</a:t>
+            </a:r>
+            <a:r>
               <a:rPr lang="en-GB" dirty="0"/>
-              <a:t>Input:</a:t>
+              <a:t>:</a:t>
             </a:r>
           </a:p>
           <a:p>
@@ -9108,8 +10735,12 @@
           </a:p>
           <a:p>
             <a:r>
+              <a:rPr lang="en-GB" i="1" dirty="0"/>
+              <a:t>Output</a:t>
+            </a:r>
+            <a:r>
               <a:rPr lang="en-GB" dirty="0"/>
-              <a:t>Output:</a:t>
+              <a:t>:</a:t>
             </a:r>
           </a:p>
           <a:p>
@@ -9224,8 +10855,12 @@
           <a:lstStyle/>
           <a:p>
             <a:r>
+              <a:rPr lang="en-GB" i="1" dirty="0"/>
+              <a:t>FPGA folder </a:t>
+            </a:r>
+            <a:r>
               <a:rPr lang="en-GB" dirty="0"/>
-              <a:t>FPGA folder contains the source code files need to run the accelerator</a:t>
+              <a:t>contains the source code files need to run the accelerator</a:t>
             </a:r>
           </a:p>
           <a:p>
@@ -9233,8 +10868,12 @@
           </a:p>
           <a:p>
             <a:r>
+              <a:rPr lang="en-GB" i="1" dirty="0"/>
+              <a:t>Software folder </a:t>
+            </a:r>
+            <a:r>
               <a:rPr lang="en-GB" dirty="0"/>
-              <a:t>Software folder contains the source code files of the optimized </a:t>
+              <a:t>contains the source code files of the optimized </a:t>
             </a:r>
           </a:p>
           <a:p>
@@ -9245,14 +10884,18 @@
             </a:r>
             <a:r>
               <a:rPr lang="en-GB" dirty="0"/>
-              <a:t> with options on </a:t>
-            </a:r>
-            <a:r>
-              <a:rPr lang="en-GB" dirty="0" err="1"/>
+              <a:t> </a:t>
+            </a:r>
+            <a:r>
+              <a:rPr lang="en-GB" i="1" dirty="0"/>
+              <a:t>with options on </a:t>
+            </a:r>
+            <a:r>
+              <a:rPr lang="en-GB" i="1" dirty="0" err="1"/>
               <a:t>cpu</a:t>
             </a:r>
             <a:r>
-              <a:rPr lang="en-GB" dirty="0"/>
+              <a:rPr lang="en-GB" i="1" dirty="0"/>
               <a:t> arch, debug flag and code profiling automation</a:t>
             </a:r>
           </a:p>
@@ -9685,12 +11328,12 @@
           <a:p>
             <a:r>
               <a:rPr lang="en-GB" dirty="0"/>
-              <a:t>Prints the output of LSAS</a:t>
-            </a:r>
-          </a:p>
-          <a:p>
-            <a:r>
-              <a:rPr lang="en-GB" dirty="0"/>
+              <a:t>Prints the output of LSAL</a:t>
+            </a:r>
+          </a:p>
+          <a:p>
+            <a:r>
+              <a:rPr lang="en-GB" i="1" dirty="0"/>
               <a:t>Known Input -&gt; Known Outputs</a:t>
             </a:r>
           </a:p>
@@ -9964,6 +11607,9 @@
           </a:bodyPr>
           <a:lstStyle/>
           <a:p>
+            <a:pPr marL="0" indent="0">
+              <a:buNone/>
+            </a:pPr>
             <a:r>
               <a:rPr lang="en-GB" dirty="0"/>
               <a:t>The results for a varying number of array sizes</a:t>

</xml_diff>